<commit_message>
Hide the LaTeX auto directories
</commit_message>
<xml_diff>
--- a/undergraduate/labs/device-drivers.pptx
+++ b/undergraduate/labs/device-drivers.pptx
@@ -199,7 +199,7 @@
           <a:p>
             <a:fld id="{EC53E720-1243-6043-B4C4-6E31C619CC0A}" type="datetimeFigureOut">
               <a:rPr lang="en-US" smtClean="0"/>
-              <a:t>2/7/17</a:t>
+              <a:t>2/28/17</a:t>
             </a:fld>
             <a:endParaRPr lang="en-US"/>
           </a:p>
@@ -698,7 +698,7 @@
           <a:p>
             <a:fld id="{6FD7C7D2-3843-074D-9A83-F18DE7D7DD8A}" type="datetime1">
               <a:rPr lang="en-US" smtClean="0"/>
-              <a:t>2/7/17</a:t>
+              <a:t>2/28/17</a:t>
             </a:fld>
             <a:endParaRPr lang="en-US"/>
           </a:p>
@@ -977,7 +977,7 @@
           <a:p>
             <a:fld id="{1845299F-DBA6-8144-8C5D-0535750AFB51}" type="datetime1">
               <a:rPr lang="en-US" smtClean="0"/>
-              <a:t>2/7/17</a:t>
+              <a:t>2/28/17</a:t>
             </a:fld>
             <a:endParaRPr lang="en-US"/>
           </a:p>
@@ -1232,7 +1232,7 @@
           <a:p>
             <a:fld id="{F317D0FE-1E91-D842-A8A8-8B23377F1877}" type="datetime1">
               <a:rPr lang="en-US" smtClean="0"/>
-              <a:t>2/7/17</a:t>
+              <a:t>2/28/17</a:t>
             </a:fld>
             <a:endParaRPr lang="en-US"/>
           </a:p>
@@ -1410,7 +1410,7 @@
           <a:p>
             <a:fld id="{BC4AE5AA-C6FF-5A4F-9D02-E3454F0B3602}" type="datetime1">
               <a:rPr lang="en-US" smtClean="0"/>
-              <a:t>2/7/17</a:t>
+              <a:t>2/28/17</a:t>
             </a:fld>
             <a:endParaRPr lang="en-US"/>
           </a:p>
@@ -1759,7 +1759,7 @@
           <a:p>
             <a:fld id="{3970F026-0185-804B-BF05-EA6EC33EA811}" type="datetime1">
               <a:rPr lang="en-US" smtClean="0"/>
-              <a:t>2/7/17</a:t>
+              <a:t>2/28/17</a:t>
             </a:fld>
             <a:endParaRPr lang="en-US"/>
           </a:p>
@@ -2053,7 +2053,7 @@
           <a:p>
             <a:fld id="{DE81AA58-E2C3-4F48-B04E-18D114E0E0D1}" type="datetime1">
               <a:rPr lang="en-US" smtClean="0"/>
-              <a:t>2/7/17</a:t>
+              <a:t>2/28/17</a:t>
             </a:fld>
             <a:endParaRPr lang="en-US" dirty="0"/>
           </a:p>
@@ -2440,7 +2440,7 @@
           <a:p>
             <a:fld id="{6EC7CDD8-D400-0544-8ADA-779D39154084}" type="datetime1">
               <a:rPr lang="en-US" smtClean="0"/>
-              <a:t>2/7/17</a:t>
+              <a:t>2/28/17</a:t>
             </a:fld>
             <a:endParaRPr lang="en-US"/>
           </a:p>
@@ -2564,7 +2564,7 @@
           <a:p>
             <a:fld id="{9FC8F57C-E466-5D4A-8BA1-0F2DC96E6599}" type="datetime1">
               <a:rPr lang="en-US" smtClean="0"/>
-              <a:t>2/7/17</a:t>
+              <a:t>2/28/17</a:t>
             </a:fld>
             <a:endParaRPr lang="en-US"/>
           </a:p>
@@ -2741,7 +2741,7 @@
           <a:p>
             <a:fld id="{DBF46B55-EA12-F74C-9AED-0C94E9DB5CD6}" type="datetime1">
               <a:rPr lang="en-US" smtClean="0"/>
-              <a:t>2/7/17</a:t>
+              <a:t>2/28/17</a:t>
             </a:fld>
             <a:endParaRPr lang="en-US"/>
           </a:p>
@@ -3101,7 +3101,7 @@
           <a:p>
             <a:fld id="{E5E2A1D4-BDD0-AA4F-B33D-67E210B458F1}" type="datetime1">
               <a:rPr lang="en-US" smtClean="0"/>
-              <a:t>2/7/17</a:t>
+              <a:t>2/28/17</a:t>
             </a:fld>
             <a:endParaRPr lang="en-US"/>
           </a:p>
@@ -3486,7 +3486,7 @@
           <a:p>
             <a:fld id="{D826F452-4A85-5248-B350-1D6DEB55B823}" type="datetime1">
               <a:rPr lang="en-US" smtClean="0"/>
-              <a:t>2/7/17</a:t>
+              <a:t>2/28/17</a:t>
             </a:fld>
             <a:endParaRPr lang="en-US"/>
           </a:p>
@@ -3773,7 +3773,7 @@
             <a:fld id="{53287F0B-3DC9-8F47-B5AF-DFDDA54774AE}" type="datetime1">
               <a:rPr lang="en-US" smtClean="0"/>
               <a:pPr/>
-              <a:t>2/7/17</a:t>
+              <a:t>2/28/17</a:t>
             </a:fld>
             <a:endParaRPr lang="en-US" dirty="0"/>
           </a:p>
@@ -4427,7 +4427,6 @@
               <a:rPr lang="en-US" dirty="0"/>
               <a:t>George Neville-Neil</a:t>
             </a:r>
-            <a:endParaRPr lang="en-US" dirty="0"/>
           </a:p>
         </p:txBody>
       </p:sp>
@@ -4563,7 +4562,7 @@
           <a:p>
             <a:fld id="{BC4AE5AA-C6FF-5A4F-9D02-E3454F0B3602}" type="datetime1">
               <a:rPr lang="en-US" smtClean="0"/>
-              <a:t>2/7/17</a:t>
+              <a:t>2/28/17</a:t>
             </a:fld>
             <a:endParaRPr lang="en-US"/>
           </a:p>
@@ -4777,7 +4776,7 @@
           <a:p>
             <a:fld id="{BC4AE5AA-C6FF-5A4F-9D02-E3454F0B3602}" type="datetime1">
               <a:rPr lang="en-US" smtClean="0"/>
-              <a:t>2/7/17</a:t>
+              <a:t>2/28/17</a:t>
             </a:fld>
             <a:endParaRPr lang="en-US"/>
           </a:p>

</xml_diff>